<commit_message>
add project of 11 lesson
</commit_message>
<xml_diff>
--- a/Урок 11.pptx
+++ b/Урок 11.pptx
@@ -128,6 +128,11 @@
       </a:defRPr>
     </a:lvl9pPr>
   </p:defaultTextStyle>
+  <p:extLst>
+    <p:ext uri="{EFAFB233-063F-42B5-8137-9DF3F51BA10A}">
+      <p15:sldGuideLst xmlns:p15="http://schemas.microsoft.com/office/powerpoint/2012/main"/>
+    </p:ext>
+  </p:extLst>
 </p:presentation>
 </file>
 
@@ -316,7 +321,7 @@
           <a:p>
             <a:fld id="{EC89228C-9266-4888-A4A0-D0EA1E7AAA32}" type="datetimeFigureOut">
               <a:rPr lang="ru-RU" smtClean="0"/>
-              <a:t>02.06.2019</a:t>
+              <a:t>05.06.2019</a:t>
             </a:fld>
             <a:endParaRPr lang="ru-RU"/>
           </a:p>
@@ -614,7 +619,7 @@
           <a:p>
             <a:fld id="{EC89228C-9266-4888-A4A0-D0EA1E7AAA32}" type="datetimeFigureOut">
               <a:rPr lang="ru-RU" smtClean="0"/>
-              <a:t>02.06.2019</a:t>
+              <a:t>05.06.2019</a:t>
             </a:fld>
             <a:endParaRPr lang="ru-RU"/>
           </a:p>
@@ -806,7 +811,7 @@
           <a:p>
             <a:fld id="{EC89228C-9266-4888-A4A0-D0EA1E7AAA32}" type="datetimeFigureOut">
               <a:rPr lang="ru-RU" smtClean="0"/>
-              <a:t>02.06.2019</a:t>
+              <a:t>05.06.2019</a:t>
             </a:fld>
             <a:endParaRPr lang="ru-RU"/>
           </a:p>
@@ -1067,7 +1072,7 @@
           <a:p>
             <a:fld id="{EC89228C-9266-4888-A4A0-D0EA1E7AAA32}" type="datetimeFigureOut">
               <a:rPr lang="ru-RU" smtClean="0"/>
-              <a:t>02.06.2019</a:t>
+              <a:t>05.06.2019</a:t>
             </a:fld>
             <a:endParaRPr lang="ru-RU"/>
           </a:p>
@@ -1491,7 +1496,7 @@
           <a:p>
             <a:fld id="{EC89228C-9266-4888-A4A0-D0EA1E7AAA32}" type="datetimeFigureOut">
               <a:rPr lang="ru-RU" smtClean="0"/>
-              <a:t>02.06.2019</a:t>
+              <a:t>05.06.2019</a:t>
             </a:fld>
             <a:endParaRPr lang="ru-RU"/>
           </a:p>
@@ -2028,7 +2033,7 @@
           <a:p>
             <a:fld id="{EC89228C-9266-4888-A4A0-D0EA1E7AAA32}" type="datetimeFigureOut">
               <a:rPr lang="ru-RU" smtClean="0"/>
-              <a:t>02.06.2019</a:t>
+              <a:t>05.06.2019</a:t>
             </a:fld>
             <a:endParaRPr lang="ru-RU"/>
           </a:p>
@@ -2892,7 +2897,7 @@
           <a:p>
             <a:fld id="{EC89228C-9266-4888-A4A0-D0EA1E7AAA32}" type="datetimeFigureOut">
               <a:rPr lang="ru-RU" smtClean="0"/>
-              <a:t>02.06.2019</a:t>
+              <a:t>05.06.2019</a:t>
             </a:fld>
             <a:endParaRPr lang="ru-RU"/>
           </a:p>
@@ -3062,7 +3067,7 @@
           <a:p>
             <a:fld id="{EC89228C-9266-4888-A4A0-D0EA1E7AAA32}" type="datetimeFigureOut">
               <a:rPr lang="ru-RU" smtClean="0"/>
-              <a:t>02.06.2019</a:t>
+              <a:t>05.06.2019</a:t>
             </a:fld>
             <a:endParaRPr lang="ru-RU"/>
           </a:p>
@@ -3246,7 +3251,7 @@
           <a:p>
             <a:fld id="{EC89228C-9266-4888-A4A0-D0EA1E7AAA32}" type="datetimeFigureOut">
               <a:rPr lang="ru-RU" smtClean="0"/>
-              <a:t>02.06.2019</a:t>
+              <a:t>05.06.2019</a:t>
             </a:fld>
             <a:endParaRPr lang="ru-RU"/>
           </a:p>
@@ -3416,7 +3421,7 @@
           <a:p>
             <a:fld id="{EC89228C-9266-4888-A4A0-D0EA1E7AAA32}" type="datetimeFigureOut">
               <a:rPr lang="ru-RU" smtClean="0"/>
-              <a:t>02.06.2019</a:t>
+              <a:t>05.06.2019</a:t>
             </a:fld>
             <a:endParaRPr lang="ru-RU"/>
           </a:p>
@@ -3660,7 +3665,7 @@
           <a:p>
             <a:fld id="{EC89228C-9266-4888-A4A0-D0EA1E7AAA32}" type="datetimeFigureOut">
               <a:rPr lang="ru-RU" smtClean="0"/>
-              <a:t>02.06.2019</a:t>
+              <a:t>05.06.2019</a:t>
             </a:fld>
             <a:endParaRPr lang="ru-RU"/>
           </a:p>
@@ -3896,7 +3901,7 @@
           <a:p>
             <a:fld id="{EC89228C-9266-4888-A4A0-D0EA1E7AAA32}" type="datetimeFigureOut">
               <a:rPr lang="ru-RU" smtClean="0"/>
-              <a:t>02.06.2019</a:t>
+              <a:t>05.06.2019</a:t>
             </a:fld>
             <a:endParaRPr lang="ru-RU"/>
           </a:p>
@@ -4362,7 +4367,7 @@
           <a:p>
             <a:fld id="{EC89228C-9266-4888-A4A0-D0EA1E7AAA32}" type="datetimeFigureOut">
               <a:rPr lang="ru-RU" smtClean="0"/>
-              <a:t>02.06.2019</a:t>
+              <a:t>05.06.2019</a:t>
             </a:fld>
             <a:endParaRPr lang="ru-RU"/>
           </a:p>
@@ -4480,7 +4485,7 @@
           <a:p>
             <a:fld id="{EC89228C-9266-4888-A4A0-D0EA1E7AAA32}" type="datetimeFigureOut">
               <a:rPr lang="ru-RU" smtClean="0"/>
-              <a:t>02.06.2019</a:t>
+              <a:t>05.06.2019</a:t>
             </a:fld>
             <a:endParaRPr lang="ru-RU"/>
           </a:p>
@@ -4575,7 +4580,7 @@
           <a:p>
             <a:fld id="{EC89228C-9266-4888-A4A0-D0EA1E7AAA32}" type="datetimeFigureOut">
               <a:rPr lang="ru-RU" smtClean="0"/>
-              <a:t>02.06.2019</a:t>
+              <a:t>05.06.2019</a:t>
             </a:fld>
             <a:endParaRPr lang="ru-RU"/>
           </a:p>
@@ -4830,7 +4835,7 @@
           <a:p>
             <a:fld id="{EC89228C-9266-4888-A4A0-D0EA1E7AAA32}" type="datetimeFigureOut">
               <a:rPr lang="ru-RU" smtClean="0"/>
-              <a:t>02.06.2019</a:t>
+              <a:t>05.06.2019</a:t>
             </a:fld>
             <a:endParaRPr lang="ru-RU"/>
           </a:p>
@@ -5130,7 +5135,7 @@
           <a:p>
             <a:fld id="{EC89228C-9266-4888-A4A0-D0EA1E7AAA32}" type="datetimeFigureOut">
               <a:rPr lang="ru-RU" smtClean="0"/>
-              <a:t>02.06.2019</a:t>
+              <a:t>05.06.2019</a:t>
             </a:fld>
             <a:endParaRPr lang="ru-RU"/>
           </a:p>
@@ -5364,7 +5369,7 @@
           <a:p>
             <a:fld id="{EC89228C-9266-4888-A4A0-D0EA1E7AAA32}" type="datetimeFigureOut">
               <a:rPr lang="ru-RU" smtClean="0"/>
-              <a:t>02.06.2019</a:t>
+              <a:t>05.06.2019</a:t>
             </a:fld>
             <a:endParaRPr lang="ru-RU"/>
           </a:p>
@@ -6684,7 +6689,6 @@
                 <a:tint val="98000"/>
               </a:schemeClr>
             </a:duotone>
-            <a:extLst/>
           </a:blip>
           <a:stretch/>
         </a:blipFill>
@@ -7141,7 +7145,6 @@
                 <a:tint val="98000"/>
               </a:schemeClr>
             </a:duotone>
-            <a:extLst/>
           </a:blip>
           <a:stretch/>
         </a:blipFill>
@@ -7536,7 +7539,6 @@
                 <a:tint val="98000"/>
               </a:schemeClr>
             </a:duotone>
-            <a:extLst/>
           </a:blip>
           <a:stretch/>
         </a:blipFill>
@@ -8291,17 +8293,19 @@
         </p:nvSpPr>
         <p:spPr/>
         <p:txBody>
-          <a:bodyPr/>
+          <a:bodyPr>
+            <a:normAutofit/>
+          </a:bodyPr>
           <a:lstStyle/>
           <a:p>
             <a:pPr marL="36900" indent="0">
               <a:buNone/>
             </a:pPr>
             <a:r>
-              <a:rPr lang="en-US" dirty="0" err="1"/>
+              <a:rPr lang="en-US" sz="5400" dirty="0" err="1"/>
               <a:t>Microsoft.AspNetCore.SignalR</a:t>
             </a:r>
-            <a:endParaRPr lang="ru-RU" dirty="0"/>
+            <a:endParaRPr lang="ru-RU" sz="5400" dirty="0"/>
           </a:p>
         </p:txBody>
       </p:sp>
@@ -8334,7 +8338,6 @@
                 <a:tint val="98000"/>
               </a:schemeClr>
             </a:duotone>
-            <a:extLst/>
           </a:blip>
           <a:stretch/>
         </a:blipFill>
@@ -8846,7 +8849,6 @@
                 <a:tint val="98000"/>
               </a:schemeClr>
             </a:duotone>
-            <a:extLst/>
           </a:blip>
           <a:stretch/>
         </a:blipFill>

</xml_diff>